<commit_message>
Update DG Architecture and Event summary
</commit_message>
<xml_diff>
--- a/docs/diagrams/ModelComponentClassDiagram.pptx
+++ b/docs/diagrams/ModelComponentClassDiagram.pptx
@@ -126,6 +126,10 @@
 </p:presentation>
 </file>
 
+<file path=ppt/revisionInfo.xml><?xml version="1.0" encoding="utf-8"?>
+<p1510:revInfo xmlns:a="http://schemas.openxmlformats.org/drawingml/2006/main" xmlns:r="http://schemas.openxmlformats.org/officeDocument/2006/relationships" xmlns:p1510="http://schemas.microsoft.com/office/powerpoint/2015/10/main"/>
+</file>
+
 <file path=ppt/notesMasters/notesMaster1.xml><?xml version="1.0" encoding="utf-8"?>
 <p:notesMaster xmlns:a="http://schemas.openxmlformats.org/drawingml/2006/main" xmlns:r="http://schemas.openxmlformats.org/officeDocument/2006/relationships" xmlns:p="http://schemas.openxmlformats.org/presentationml/2006/main">
   <p:cSld>
@@ -208,7 +212,7 @@
           <a:p>
             <a:fld id="{F5CC4B3F-88C1-4FFA-B1B6-F41C21DC6924}" type="datetimeFigureOut">
               <a:rPr lang="en-US" smtClean="0"/>
-              <a:t>9/4/17</a:t>
+              <a:t>10/30/2017</a:t>
             </a:fld>
             <a:endParaRPr lang="en-US"/>
           </a:p>
@@ -272,38 +276,37 @@
           <a:p>
             <a:pPr lvl="0"/>
             <a:r>
-              <a:rPr lang="en-US" smtClean="0"/>
+              <a:rPr lang="en-US"/>
               <a:t>Click to edit Master text styles</a:t>
             </a:r>
           </a:p>
           <a:p>
             <a:pPr lvl="1"/>
             <a:r>
-              <a:rPr lang="en-US" smtClean="0"/>
+              <a:rPr lang="en-US"/>
               <a:t>Second level</a:t>
             </a:r>
           </a:p>
           <a:p>
             <a:pPr lvl="2"/>
             <a:r>
-              <a:rPr lang="en-US" smtClean="0"/>
+              <a:rPr lang="en-US"/>
               <a:t>Third level</a:t>
             </a:r>
           </a:p>
           <a:p>
             <a:pPr lvl="3"/>
             <a:r>
-              <a:rPr lang="en-US" smtClean="0"/>
+              <a:rPr lang="en-US"/>
               <a:t>Fourth level</a:t>
             </a:r>
           </a:p>
           <a:p>
             <a:pPr lvl="4"/>
             <a:r>
-              <a:rPr lang="en-US" smtClean="0"/>
+              <a:rPr lang="en-US"/>
               <a:t>Fifth level</a:t>
             </a:r>
-            <a:endParaRPr lang="en-US"/>
           </a:p>
         </p:txBody>
       </p:sp>
@@ -514,10 +517,9 @@
           <a:lstStyle/>
           <a:p>
             <a:r>
-              <a:rPr lang="en-US" smtClean="0"/>
+              <a:rPr lang="en-US"/>
               <a:t>Click to edit Master title style</a:t>
             </a:r>
-            <a:endParaRPr lang="en-US"/>
           </a:p>
         </p:txBody>
       </p:sp>
@@ -633,10 +635,9 @@
           </a:lstStyle>
           <a:p>
             <a:r>
-              <a:rPr lang="en-US" smtClean="0"/>
+              <a:rPr lang="en-US"/>
               <a:t>Click to edit Master subtitle style</a:t>
             </a:r>
-            <a:endParaRPr lang="en-US"/>
           </a:p>
         </p:txBody>
       </p:sp>
@@ -657,7 +658,7 @@
           <a:p>
             <a:fld id="{78C97017-6FC3-485B-9764-EAC9E56C1D49}" type="datetimeFigureOut">
               <a:rPr lang="en-US" smtClean="0"/>
-              <a:t>9/4/17</a:t>
+              <a:t>10/30/2017</a:t>
             </a:fld>
             <a:endParaRPr lang="en-US"/>
           </a:p>
@@ -751,10 +752,9 @@
           <a:lstStyle/>
           <a:p>
             <a:r>
-              <a:rPr lang="en-US" smtClean="0"/>
+              <a:rPr lang="en-US"/>
               <a:t>Click to edit Master title style</a:t>
             </a:r>
-            <a:endParaRPr lang="en-US"/>
           </a:p>
         </p:txBody>
       </p:sp>
@@ -775,38 +775,37 @@
           <a:p>
             <a:pPr lvl="0"/>
             <a:r>
-              <a:rPr lang="en-US" smtClean="0"/>
+              <a:rPr lang="en-US"/>
               <a:t>Click to edit Master text styles</a:t>
             </a:r>
           </a:p>
           <a:p>
             <a:pPr lvl="1"/>
             <a:r>
-              <a:rPr lang="en-US" smtClean="0"/>
+              <a:rPr lang="en-US"/>
               <a:t>Second level</a:t>
             </a:r>
           </a:p>
           <a:p>
             <a:pPr lvl="2"/>
             <a:r>
-              <a:rPr lang="en-US" smtClean="0"/>
+              <a:rPr lang="en-US"/>
               <a:t>Third level</a:t>
             </a:r>
           </a:p>
           <a:p>
             <a:pPr lvl="3"/>
             <a:r>
-              <a:rPr lang="en-US" smtClean="0"/>
+              <a:rPr lang="en-US"/>
               <a:t>Fourth level</a:t>
             </a:r>
           </a:p>
           <a:p>
             <a:pPr lvl="4"/>
             <a:r>
-              <a:rPr lang="en-US" smtClean="0"/>
+              <a:rPr lang="en-US"/>
               <a:t>Fifth level</a:t>
             </a:r>
-            <a:endParaRPr lang="en-US"/>
           </a:p>
         </p:txBody>
       </p:sp>
@@ -827,7 +826,7 @@
           <a:p>
             <a:fld id="{78C97017-6FC3-485B-9764-EAC9E56C1D49}" type="datetimeFigureOut">
               <a:rPr lang="en-US" smtClean="0"/>
-              <a:t>9/4/17</a:t>
+              <a:t>10/30/2017</a:t>
             </a:fld>
             <a:endParaRPr lang="en-US"/>
           </a:p>
@@ -926,10 +925,9 @@
           <a:lstStyle/>
           <a:p>
             <a:r>
-              <a:rPr lang="en-US" smtClean="0"/>
+              <a:rPr lang="en-US"/>
               <a:t>Click to edit Master title style</a:t>
             </a:r>
-            <a:endParaRPr lang="en-US"/>
           </a:p>
         </p:txBody>
       </p:sp>
@@ -955,38 +953,37 @@
           <a:p>
             <a:pPr lvl="0"/>
             <a:r>
-              <a:rPr lang="en-US" smtClean="0"/>
+              <a:rPr lang="en-US"/>
               <a:t>Click to edit Master text styles</a:t>
             </a:r>
           </a:p>
           <a:p>
             <a:pPr lvl="1"/>
             <a:r>
-              <a:rPr lang="en-US" smtClean="0"/>
+              <a:rPr lang="en-US"/>
               <a:t>Second level</a:t>
             </a:r>
           </a:p>
           <a:p>
             <a:pPr lvl="2"/>
             <a:r>
-              <a:rPr lang="en-US" smtClean="0"/>
+              <a:rPr lang="en-US"/>
               <a:t>Third level</a:t>
             </a:r>
           </a:p>
           <a:p>
             <a:pPr lvl="3"/>
             <a:r>
-              <a:rPr lang="en-US" smtClean="0"/>
+              <a:rPr lang="en-US"/>
               <a:t>Fourth level</a:t>
             </a:r>
           </a:p>
           <a:p>
             <a:pPr lvl="4"/>
             <a:r>
-              <a:rPr lang="en-US" smtClean="0"/>
+              <a:rPr lang="en-US"/>
               <a:t>Fifth level</a:t>
             </a:r>
-            <a:endParaRPr lang="en-US"/>
           </a:p>
         </p:txBody>
       </p:sp>
@@ -1007,7 +1004,7 @@
           <a:p>
             <a:fld id="{78C97017-6FC3-485B-9764-EAC9E56C1D49}" type="datetimeFigureOut">
               <a:rPr lang="en-US" smtClean="0"/>
-              <a:t>9/4/17</a:t>
+              <a:t>10/30/2017</a:t>
             </a:fld>
             <a:endParaRPr lang="en-US"/>
           </a:p>
@@ -1101,10 +1098,9 @@
           <a:lstStyle/>
           <a:p>
             <a:r>
-              <a:rPr lang="en-US" smtClean="0"/>
+              <a:rPr lang="en-US"/>
               <a:t>Click to edit Master title style</a:t>
             </a:r>
-            <a:endParaRPr lang="en-US"/>
           </a:p>
         </p:txBody>
       </p:sp>
@@ -1125,38 +1121,37 @@
           <a:p>
             <a:pPr lvl="0"/>
             <a:r>
-              <a:rPr lang="en-US" smtClean="0"/>
+              <a:rPr lang="en-US"/>
               <a:t>Click to edit Master text styles</a:t>
             </a:r>
           </a:p>
           <a:p>
             <a:pPr lvl="1"/>
             <a:r>
-              <a:rPr lang="en-US" smtClean="0"/>
+              <a:rPr lang="en-US"/>
               <a:t>Second level</a:t>
             </a:r>
           </a:p>
           <a:p>
             <a:pPr lvl="2"/>
             <a:r>
-              <a:rPr lang="en-US" smtClean="0"/>
+              <a:rPr lang="en-US"/>
               <a:t>Third level</a:t>
             </a:r>
           </a:p>
           <a:p>
             <a:pPr lvl="3"/>
             <a:r>
-              <a:rPr lang="en-US" smtClean="0"/>
+              <a:rPr lang="en-US"/>
               <a:t>Fourth level</a:t>
             </a:r>
           </a:p>
           <a:p>
             <a:pPr lvl="4"/>
             <a:r>
-              <a:rPr lang="en-US" smtClean="0"/>
+              <a:rPr lang="en-US"/>
               <a:t>Fifth level</a:t>
             </a:r>
-            <a:endParaRPr lang="en-US"/>
           </a:p>
         </p:txBody>
       </p:sp>
@@ -1177,7 +1172,7 @@
           <a:p>
             <a:fld id="{78C97017-6FC3-485B-9764-EAC9E56C1D49}" type="datetimeFigureOut">
               <a:rPr lang="en-US" smtClean="0"/>
-              <a:t>9/4/17</a:t>
+              <a:t>10/30/2017</a:t>
             </a:fld>
             <a:endParaRPr lang="en-US"/>
           </a:p>
@@ -1280,10 +1275,9 @@
           </a:lstStyle>
           <a:p>
             <a:r>
-              <a:rPr lang="en-US" smtClean="0"/>
+              <a:rPr lang="en-US"/>
               <a:t>Click to edit Master title style</a:t>
             </a:r>
-            <a:endParaRPr lang="en-US"/>
           </a:p>
         </p:txBody>
       </p:sp>
@@ -1400,7 +1394,7 @@
           <a:p>
             <a:pPr lvl="0"/>
             <a:r>
-              <a:rPr lang="en-US" smtClean="0"/>
+              <a:rPr lang="en-US"/>
               <a:t>Click to edit Master text styles</a:t>
             </a:r>
           </a:p>
@@ -1423,7 +1417,7 @@
           <a:p>
             <a:fld id="{78C97017-6FC3-485B-9764-EAC9E56C1D49}" type="datetimeFigureOut">
               <a:rPr lang="en-US" smtClean="0"/>
-              <a:t>9/4/17</a:t>
+              <a:t>10/30/2017</a:t>
             </a:fld>
             <a:endParaRPr lang="en-US"/>
           </a:p>
@@ -1517,10 +1511,9 @@
           <a:lstStyle/>
           <a:p>
             <a:r>
-              <a:rPr lang="en-US" smtClean="0"/>
+              <a:rPr lang="en-US"/>
               <a:t>Click to edit Master title style</a:t>
             </a:r>
-            <a:endParaRPr lang="en-US"/>
           </a:p>
         </p:txBody>
       </p:sp>
@@ -1574,38 +1567,37 @@
           <a:p>
             <a:pPr lvl="0"/>
             <a:r>
-              <a:rPr lang="en-US" smtClean="0"/>
+              <a:rPr lang="en-US"/>
               <a:t>Click to edit Master text styles</a:t>
             </a:r>
           </a:p>
           <a:p>
             <a:pPr lvl="1"/>
             <a:r>
-              <a:rPr lang="en-US" smtClean="0"/>
+              <a:rPr lang="en-US"/>
               <a:t>Second level</a:t>
             </a:r>
           </a:p>
           <a:p>
             <a:pPr lvl="2"/>
             <a:r>
-              <a:rPr lang="en-US" smtClean="0"/>
+              <a:rPr lang="en-US"/>
               <a:t>Third level</a:t>
             </a:r>
           </a:p>
           <a:p>
             <a:pPr lvl="3"/>
             <a:r>
-              <a:rPr lang="en-US" smtClean="0"/>
+              <a:rPr lang="en-US"/>
               <a:t>Fourth level</a:t>
             </a:r>
           </a:p>
           <a:p>
             <a:pPr lvl="4"/>
             <a:r>
-              <a:rPr lang="en-US" smtClean="0"/>
+              <a:rPr lang="en-US"/>
               <a:t>Fifth level</a:t>
             </a:r>
-            <a:endParaRPr lang="en-US"/>
           </a:p>
         </p:txBody>
       </p:sp>
@@ -1659,38 +1651,37 @@
           <a:p>
             <a:pPr lvl="0"/>
             <a:r>
-              <a:rPr lang="en-US" smtClean="0"/>
+              <a:rPr lang="en-US"/>
               <a:t>Click to edit Master text styles</a:t>
             </a:r>
           </a:p>
           <a:p>
             <a:pPr lvl="1"/>
             <a:r>
-              <a:rPr lang="en-US" smtClean="0"/>
+              <a:rPr lang="en-US"/>
               <a:t>Second level</a:t>
             </a:r>
           </a:p>
           <a:p>
             <a:pPr lvl="2"/>
             <a:r>
-              <a:rPr lang="en-US" smtClean="0"/>
+              <a:rPr lang="en-US"/>
               <a:t>Third level</a:t>
             </a:r>
           </a:p>
           <a:p>
             <a:pPr lvl="3"/>
             <a:r>
-              <a:rPr lang="en-US" smtClean="0"/>
+              <a:rPr lang="en-US"/>
               <a:t>Fourth level</a:t>
             </a:r>
           </a:p>
           <a:p>
             <a:pPr lvl="4"/>
             <a:r>
-              <a:rPr lang="en-US" smtClean="0"/>
+              <a:rPr lang="en-US"/>
               <a:t>Fifth level</a:t>
             </a:r>
-            <a:endParaRPr lang="en-US"/>
           </a:p>
         </p:txBody>
       </p:sp>
@@ -1711,7 +1702,7 @@
           <a:p>
             <a:fld id="{78C97017-6FC3-485B-9764-EAC9E56C1D49}" type="datetimeFigureOut">
               <a:rPr lang="en-US" smtClean="0"/>
-              <a:t>9/4/17</a:t>
+              <a:t>10/30/2017</a:t>
             </a:fld>
             <a:endParaRPr lang="en-US"/>
           </a:p>
@@ -1809,10 +1800,9 @@
           </a:lstStyle>
           <a:p>
             <a:r>
-              <a:rPr lang="en-US" smtClean="0"/>
+              <a:rPr lang="en-US"/>
               <a:t>Click to edit Master title style</a:t>
             </a:r>
-            <a:endParaRPr lang="en-US"/>
           </a:p>
         </p:txBody>
       </p:sp>
@@ -1875,7 +1865,7 @@
           <a:p>
             <a:pPr lvl="0"/>
             <a:r>
-              <a:rPr lang="en-US" smtClean="0"/>
+              <a:rPr lang="en-US"/>
               <a:t>Click to edit Master text styles</a:t>
             </a:r>
           </a:p>
@@ -1931,38 +1921,37 @@
           <a:p>
             <a:pPr lvl="0"/>
             <a:r>
-              <a:rPr lang="en-US" smtClean="0"/>
+              <a:rPr lang="en-US"/>
               <a:t>Click to edit Master text styles</a:t>
             </a:r>
           </a:p>
           <a:p>
             <a:pPr lvl="1"/>
             <a:r>
-              <a:rPr lang="en-US" smtClean="0"/>
+              <a:rPr lang="en-US"/>
               <a:t>Second level</a:t>
             </a:r>
           </a:p>
           <a:p>
             <a:pPr lvl="2"/>
             <a:r>
-              <a:rPr lang="en-US" smtClean="0"/>
+              <a:rPr lang="en-US"/>
               <a:t>Third level</a:t>
             </a:r>
           </a:p>
           <a:p>
             <a:pPr lvl="3"/>
             <a:r>
-              <a:rPr lang="en-US" smtClean="0"/>
+              <a:rPr lang="en-US"/>
               <a:t>Fourth level</a:t>
             </a:r>
           </a:p>
           <a:p>
             <a:pPr lvl="4"/>
             <a:r>
-              <a:rPr lang="en-US" smtClean="0"/>
+              <a:rPr lang="en-US"/>
               <a:t>Fifth level</a:t>
             </a:r>
-            <a:endParaRPr lang="en-US"/>
           </a:p>
         </p:txBody>
       </p:sp>
@@ -2025,7 +2014,7 @@
           <a:p>
             <a:pPr lvl="0"/>
             <a:r>
-              <a:rPr lang="en-US" smtClean="0"/>
+              <a:rPr lang="en-US"/>
               <a:t>Click to edit Master text styles</a:t>
             </a:r>
           </a:p>
@@ -2081,38 +2070,37 @@
           <a:p>
             <a:pPr lvl="0"/>
             <a:r>
-              <a:rPr lang="en-US" smtClean="0"/>
+              <a:rPr lang="en-US"/>
               <a:t>Click to edit Master text styles</a:t>
             </a:r>
           </a:p>
           <a:p>
             <a:pPr lvl="1"/>
             <a:r>
-              <a:rPr lang="en-US" smtClean="0"/>
+              <a:rPr lang="en-US"/>
               <a:t>Second level</a:t>
             </a:r>
           </a:p>
           <a:p>
             <a:pPr lvl="2"/>
             <a:r>
-              <a:rPr lang="en-US" smtClean="0"/>
+              <a:rPr lang="en-US"/>
               <a:t>Third level</a:t>
             </a:r>
           </a:p>
           <a:p>
             <a:pPr lvl="3"/>
             <a:r>
-              <a:rPr lang="en-US" smtClean="0"/>
+              <a:rPr lang="en-US"/>
               <a:t>Fourth level</a:t>
             </a:r>
           </a:p>
           <a:p>
             <a:pPr lvl="4"/>
             <a:r>
-              <a:rPr lang="en-US" smtClean="0"/>
+              <a:rPr lang="en-US"/>
               <a:t>Fifth level</a:t>
             </a:r>
-            <a:endParaRPr lang="en-US"/>
           </a:p>
         </p:txBody>
       </p:sp>
@@ -2133,7 +2121,7 @@
           <a:p>
             <a:fld id="{78C97017-6FC3-485B-9764-EAC9E56C1D49}" type="datetimeFigureOut">
               <a:rPr lang="en-US" smtClean="0"/>
-              <a:t>9/4/17</a:t>
+              <a:t>10/30/2017</a:t>
             </a:fld>
             <a:endParaRPr lang="en-US"/>
           </a:p>
@@ -2227,10 +2215,9 @@
           <a:lstStyle/>
           <a:p>
             <a:r>
-              <a:rPr lang="en-US" smtClean="0"/>
+              <a:rPr lang="en-US"/>
               <a:t>Click to edit Master title style</a:t>
             </a:r>
-            <a:endParaRPr lang="en-US"/>
           </a:p>
         </p:txBody>
       </p:sp>
@@ -2251,7 +2238,7 @@
           <a:p>
             <a:fld id="{78C97017-6FC3-485B-9764-EAC9E56C1D49}" type="datetimeFigureOut">
               <a:rPr lang="en-US" smtClean="0"/>
-              <a:t>9/4/17</a:t>
+              <a:t>10/30/2017</a:t>
             </a:fld>
             <a:endParaRPr lang="en-US"/>
           </a:p>
@@ -2346,7 +2333,7 @@
           <a:p>
             <a:fld id="{78C97017-6FC3-485B-9764-EAC9E56C1D49}" type="datetimeFigureOut">
               <a:rPr lang="en-US" smtClean="0"/>
-              <a:t>9/4/17</a:t>
+              <a:t>10/30/2017</a:t>
             </a:fld>
             <a:endParaRPr lang="en-US"/>
           </a:p>
@@ -2449,10 +2436,9 @@
           </a:lstStyle>
           <a:p>
             <a:r>
-              <a:rPr lang="en-US" smtClean="0"/>
+              <a:rPr lang="en-US"/>
               <a:t>Click to edit Master title style</a:t>
             </a:r>
-            <a:endParaRPr lang="en-US"/>
           </a:p>
         </p:txBody>
       </p:sp>
@@ -2506,38 +2492,37 @@
           <a:p>
             <a:pPr lvl="0"/>
             <a:r>
-              <a:rPr lang="en-US" smtClean="0"/>
+              <a:rPr lang="en-US"/>
               <a:t>Click to edit Master text styles</a:t>
             </a:r>
           </a:p>
           <a:p>
             <a:pPr lvl="1"/>
             <a:r>
-              <a:rPr lang="en-US" smtClean="0"/>
+              <a:rPr lang="en-US"/>
               <a:t>Second level</a:t>
             </a:r>
           </a:p>
           <a:p>
             <a:pPr lvl="2"/>
             <a:r>
-              <a:rPr lang="en-US" smtClean="0"/>
+              <a:rPr lang="en-US"/>
               <a:t>Third level</a:t>
             </a:r>
           </a:p>
           <a:p>
             <a:pPr lvl="3"/>
             <a:r>
-              <a:rPr lang="en-US" smtClean="0"/>
+              <a:rPr lang="en-US"/>
               <a:t>Fourth level</a:t>
             </a:r>
           </a:p>
           <a:p>
             <a:pPr lvl="4"/>
             <a:r>
-              <a:rPr lang="en-US" smtClean="0"/>
+              <a:rPr lang="en-US"/>
               <a:t>Fifth level</a:t>
             </a:r>
-            <a:endParaRPr lang="en-US"/>
           </a:p>
         </p:txBody>
       </p:sp>
@@ -2600,7 +2585,7 @@
           <a:p>
             <a:pPr lvl="0"/>
             <a:r>
-              <a:rPr lang="en-US" smtClean="0"/>
+              <a:rPr lang="en-US"/>
               <a:t>Click to edit Master text styles</a:t>
             </a:r>
           </a:p>
@@ -2623,7 +2608,7 @@
           <a:p>
             <a:fld id="{78C97017-6FC3-485B-9764-EAC9E56C1D49}" type="datetimeFigureOut">
               <a:rPr lang="en-US" smtClean="0"/>
-              <a:t>9/4/17</a:t>
+              <a:t>10/30/2017</a:t>
             </a:fld>
             <a:endParaRPr lang="en-US"/>
           </a:p>
@@ -2726,10 +2711,9 @@
           </a:lstStyle>
           <a:p>
             <a:r>
-              <a:rPr lang="en-US" smtClean="0"/>
+              <a:rPr lang="en-US"/>
               <a:t>Click to edit Master title style</a:t>
             </a:r>
-            <a:endParaRPr lang="en-US"/>
           </a:p>
         </p:txBody>
       </p:sp>
@@ -2853,7 +2837,7 @@
           <a:p>
             <a:pPr lvl="0"/>
             <a:r>
-              <a:rPr lang="en-US" smtClean="0"/>
+              <a:rPr lang="en-US"/>
               <a:t>Click to edit Master text styles</a:t>
             </a:r>
           </a:p>
@@ -2876,7 +2860,7 @@
           <a:p>
             <a:fld id="{78C97017-6FC3-485B-9764-EAC9E56C1D49}" type="datetimeFigureOut">
               <a:rPr lang="en-US" smtClean="0"/>
-              <a:t>9/4/17</a:t>
+              <a:t>10/30/2017</a:t>
             </a:fld>
             <a:endParaRPr lang="en-US"/>
           </a:p>
@@ -2985,10 +2969,9 @@
           <a:lstStyle/>
           <a:p>
             <a:r>
-              <a:rPr lang="en-US" smtClean="0"/>
+              <a:rPr lang="en-US"/>
               <a:t>Click to edit Master title style</a:t>
             </a:r>
-            <a:endParaRPr lang="en-US"/>
           </a:p>
         </p:txBody>
       </p:sp>
@@ -3019,38 +3002,37 @@
           <a:p>
             <a:pPr lvl="0"/>
             <a:r>
-              <a:rPr lang="en-US" smtClean="0"/>
+              <a:rPr lang="en-US"/>
               <a:t>Click to edit Master text styles</a:t>
             </a:r>
           </a:p>
           <a:p>
             <a:pPr lvl="1"/>
             <a:r>
-              <a:rPr lang="en-US" smtClean="0"/>
+              <a:rPr lang="en-US"/>
               <a:t>Second level</a:t>
             </a:r>
           </a:p>
           <a:p>
             <a:pPr lvl="2"/>
             <a:r>
-              <a:rPr lang="en-US" smtClean="0"/>
+              <a:rPr lang="en-US"/>
               <a:t>Third level</a:t>
             </a:r>
           </a:p>
           <a:p>
             <a:pPr lvl="3"/>
             <a:r>
-              <a:rPr lang="en-US" smtClean="0"/>
+              <a:rPr lang="en-US"/>
               <a:t>Fourth level</a:t>
             </a:r>
           </a:p>
           <a:p>
             <a:pPr lvl="4"/>
             <a:r>
-              <a:rPr lang="en-US" smtClean="0"/>
+              <a:rPr lang="en-US"/>
               <a:t>Fifth level</a:t>
             </a:r>
-            <a:endParaRPr lang="en-US"/>
           </a:p>
         </p:txBody>
       </p:sp>
@@ -3089,7 +3071,7 @@
           <a:p>
             <a:fld id="{78C97017-6FC3-485B-9764-EAC9E56C1D49}" type="datetimeFigureOut">
               <a:rPr lang="en-US" smtClean="0"/>
-              <a:t>9/4/17</a:t>
+              <a:t>10/30/2017</a:t>
             </a:fld>
             <a:endParaRPr lang="en-US"/>
           </a:p>
@@ -3472,8 +3454,8 @@
         </p:nvSpPr>
         <p:spPr>
           <a:xfrm>
-            <a:off x="1119865" y="1727200"/>
-            <a:ext cx="7490735" cy="2997200"/>
+            <a:off x="1119865" y="1209071"/>
+            <a:ext cx="7490735" cy="4648200"/>
           </a:xfrm>
           <a:prstGeom prst="roundRect">
             <a:avLst>
@@ -3510,7 +3492,7 @@
           <a:lstStyle/>
           <a:p>
             <a:r>
-              <a:rPr lang="en-US" sz="1200" b="1" dirty="0" smtClean="0">
+              <a:rPr lang="en-US" sz="1200" b="1" dirty="0">
                 <a:solidFill>
                   <a:srgbClr val="7030A0"/>
                 </a:solidFill>
@@ -3569,7 +3551,7 @@
           <a:p>
             <a:pPr algn="ctr"/>
             <a:r>
-              <a:rPr lang="en-US" sz="1050" dirty="0" err="1" smtClean="0">
+              <a:rPr lang="en-US" sz="1050" dirty="0">
                 <a:solidFill>
                   <a:schemeClr val="bg1"/>
                 </a:solidFill>
@@ -3628,7 +3610,7 @@
           <a:p>
             <a:pPr algn="ctr"/>
             <a:r>
-              <a:rPr lang="en-US" sz="1050" dirty="0" err="1" smtClean="0">
+              <a:rPr lang="en-US" sz="1050" dirty="0">
                 <a:solidFill>
                   <a:schemeClr val="bg1"/>
                 </a:solidFill>
@@ -3688,43 +3670,40 @@
         <p:nvCxnSpPr>
           <p:cNvPr id="107" name="Elbow Connector 106"/>
           <p:cNvCxnSpPr>
-            <a:stCxn id="9" idx="1"/>
+            <a:cxnSpLocks/>
           </p:cNvCxnSpPr>
           <p:nvPr/>
         </p:nvCxnSpPr>
         <p:spPr>
-          <a:xfrm rot="5400000" flipH="1" flipV="1">
-            <a:off x="4360065" y="1080909"/>
-            <a:ext cx="378691" cy="4637261"/>
-          </a:xfrm>
-          <a:prstGeom prst="bentConnector4">
+          <a:xfrm rot="16200000" flipH="1">
+            <a:off x="4344425" y="486023"/>
+            <a:ext cx="362816" cy="4436989"/>
+          </a:xfrm>
+          <a:prstGeom prst="bentConnector3">
             <a:avLst>
-              <a:gd name="adj1" fmla="val -101829"/>
-              <a:gd name="adj2" fmla="val 99976"/>
+              <a:gd name="adj1" fmla="val -263342"/>
             </a:avLst>
           </a:prstGeom>
           <a:ln w="19050">
             <a:solidFill>
               <a:srgbClr val="7030A0"/>
             </a:solidFill>
-            <a:prstDash val="solid"/>
             <a:headEnd type="none" w="med" len="med"/>
             <a:tailEnd type="arrow" w="med" len="med"/>
           </a:ln>
-          <a:effectLst/>
         </p:spPr>
         <p:style>
           <a:lnRef idx="1">
-            <a:schemeClr val="accent2"/>
+            <a:schemeClr val="accent4"/>
           </a:lnRef>
-          <a:fillRef idx="2">
-            <a:schemeClr val="accent2"/>
+          <a:fillRef idx="0">
+            <a:schemeClr val="accent4"/>
           </a:fillRef>
-          <a:effectRef idx="1">
-            <a:schemeClr val="accent2"/>
+          <a:effectRef idx="0">
+            <a:schemeClr val="accent4"/>
           </a:effectRef>
           <a:fontRef idx="minor">
-            <a:schemeClr val="dk1"/>
+            <a:schemeClr val="tx1"/>
           </a:fontRef>
         </p:style>
       </p:cxnSp>
@@ -3783,7 +3762,7 @@
           <a:p>
             <a:pPr algn="ctr"/>
             <a:r>
-              <a:rPr lang="en-US" sz="1050" dirty="0" smtClean="0">
+              <a:rPr lang="en-US" sz="1050" dirty="0">
                 <a:solidFill>
                   <a:schemeClr val="bg1"/>
                 </a:solidFill>
@@ -4107,7 +4086,7 @@
           <a:p>
             <a:pPr algn="ctr"/>
             <a:r>
-              <a:rPr lang="en-US" sz="1050" dirty="0" err="1" smtClean="0">
+              <a:rPr lang="en-US" sz="1050" dirty="0">
                 <a:solidFill>
                   <a:srgbClr val="7030A0"/>
                 </a:solidFill>
@@ -4249,7 +4228,7 @@
           <a:p>
             <a:pPr algn="ctr"/>
             <a:r>
-              <a:rPr lang="en-US" sz="1050" dirty="0" err="1" smtClean="0">
+              <a:rPr lang="en-US" sz="1050" dirty="0">
                 <a:solidFill>
                   <a:srgbClr val="7030A0"/>
                 </a:solidFill>
@@ -4393,7 +4372,7 @@
           <a:p>
             <a:pPr algn="ctr"/>
             <a:r>
-              <a:rPr lang="en-US" sz="1050" dirty="0" err="1" smtClean="0">
+              <a:rPr lang="en-US" sz="1050" dirty="0">
                 <a:solidFill>
                   <a:srgbClr val="7030A0"/>
                 </a:solidFill>
@@ -4492,7 +4471,7 @@
           <a:p>
             <a:pPr algn="ctr"/>
             <a:r>
-              <a:rPr lang="en-US" sz="1050" dirty="0" smtClean="0">
+              <a:rPr lang="en-US" sz="1050" dirty="0">
                 <a:solidFill>
                   <a:srgbClr val="7030A0"/>
                 </a:solidFill>
@@ -4634,7 +4613,7 @@
           <a:p>
             <a:pPr algn="ctr"/>
             <a:r>
-              <a:rPr lang="en-US" sz="1050" dirty="0" smtClean="0">
+              <a:rPr lang="en-US" sz="1050" dirty="0">
                 <a:solidFill>
                   <a:srgbClr val="7030A0"/>
                 </a:solidFill>
@@ -4776,7 +4755,7 @@
           <a:p>
             <a:pPr algn="ctr"/>
             <a:r>
-              <a:rPr lang="en-US" sz="1050" dirty="0" smtClean="0">
+              <a:rPr lang="en-US" sz="1050" dirty="0">
                 <a:solidFill>
                   <a:srgbClr val="7030A0"/>
                 </a:solidFill>
@@ -4784,14 +4763,14 @@
               <a:t>&lt;&lt;interface&gt;&gt;</a:t>
             </a:r>
             <a:br>
-              <a:rPr lang="en-US" sz="1050" dirty="0" smtClean="0">
+              <a:rPr lang="en-US" sz="1050" dirty="0">
                 <a:solidFill>
                   <a:srgbClr val="7030A0"/>
                 </a:solidFill>
               </a:rPr>
             </a:br>
             <a:r>
-              <a:rPr lang="en-US" sz="1050" dirty="0" err="1" smtClean="0">
+              <a:rPr lang="en-US" sz="1050" dirty="0">
                 <a:solidFill>
                   <a:srgbClr val="7030A0"/>
                 </a:solidFill>
@@ -4847,7 +4826,7 @@
           <a:p>
             <a:pPr algn="ctr"/>
             <a:r>
-              <a:rPr lang="en-US" sz="1050" dirty="0" smtClean="0">
+              <a:rPr lang="en-US" sz="1050" dirty="0">
                 <a:solidFill>
                   <a:srgbClr val="7030A0"/>
                 </a:solidFill>
@@ -4991,7 +4970,7 @@
           <a:p>
             <a:pPr algn="ctr"/>
             <a:r>
-              <a:rPr lang="en-US" sz="1050" dirty="0" smtClean="0">
+              <a:rPr lang="en-US" sz="1050" dirty="0">
                 <a:solidFill>
                   <a:srgbClr val="7030A0"/>
                 </a:solidFill>
@@ -5088,7 +5067,7 @@
           <a:p>
             <a:pPr algn="ctr"/>
             <a:r>
-              <a:rPr lang="en-US" sz="1050" dirty="0" smtClean="0">
+              <a:rPr lang="en-US" sz="1050" dirty="0">
                 <a:solidFill>
                   <a:srgbClr val="7030A0"/>
                 </a:solidFill>
@@ -5185,7 +5164,7 @@
           <a:p>
             <a:pPr algn="ctr"/>
             <a:r>
-              <a:rPr lang="en-US" sz="1050" dirty="0" smtClean="0">
+              <a:rPr lang="en-US" sz="1050" dirty="0">
                 <a:solidFill>
                   <a:srgbClr val="7030A0"/>
                 </a:solidFill>
@@ -5373,7 +5352,7 @@
           <a:p>
             <a:pPr algn="ctr"/>
             <a:r>
-              <a:rPr lang="en-US" sz="1050" dirty="0" smtClean="0">
+              <a:rPr lang="en-US" sz="1050" dirty="0">
                 <a:solidFill>
                   <a:srgbClr val="7030A0"/>
                 </a:solidFill>
@@ -5381,14 +5360,14 @@
               <a:t>&lt;&lt;interface&gt;&gt;</a:t>
             </a:r>
             <a:br>
-              <a:rPr lang="en-US" sz="1050" dirty="0" smtClean="0">
+              <a:rPr lang="en-US" sz="1050" dirty="0">
                 <a:solidFill>
                   <a:srgbClr val="7030A0"/>
                 </a:solidFill>
               </a:rPr>
             </a:br>
             <a:r>
-              <a:rPr lang="en-US" sz="1050" dirty="0" err="1" smtClean="0">
+              <a:rPr lang="en-US" sz="1050" dirty="0">
                 <a:solidFill>
                   <a:srgbClr val="7030A0"/>
                 </a:solidFill>
@@ -5411,7 +5390,7 @@
         </p:nvSpPr>
         <p:spPr>
           <a:xfrm rot="16200000">
-            <a:off x="6527512" y="3586305"/>
+            <a:off x="6447810" y="2281022"/>
             <a:ext cx="881018" cy="261610"/>
           </a:xfrm>
           <a:prstGeom prst="rect">
@@ -5427,7 +5406,7 @@
           <a:p>
             <a:pPr algn="r"/>
             <a:r>
-              <a:rPr lang="en-US" sz="1100" dirty="0" smtClean="0">
+              <a:rPr lang="en-US" sz="1100" dirty="0">
                 <a:solidFill>
                   <a:srgbClr val="7030A0"/>
                 </a:solidFill>
@@ -5450,7 +5429,7 @@
         </p:nvSpPr>
         <p:spPr>
           <a:xfrm>
-            <a:off x="2057401" y="4239491"/>
+            <a:off x="1810380" y="5237162"/>
             <a:ext cx="1066800" cy="346760"/>
           </a:xfrm>
           <a:prstGeom prst="rect">
@@ -5483,30 +5462,22 @@
           <a:p>
             <a:pPr algn="ctr"/>
             <a:r>
-              <a:rPr lang="en-US" sz="1050" dirty="0" smtClean="0">
+              <a:rPr lang="en-US" sz="1050" dirty="0">
                 <a:solidFill>
                   <a:srgbClr val="7030A0"/>
                 </a:solidFill>
               </a:rPr>
               <a:t>&lt;&lt;interface&gt;&gt;</a:t>
             </a:r>
-            <a:r>
-              <a:rPr lang="en-US" sz="1050">
-                <a:solidFill>
-                  <a:srgbClr val="7030A0"/>
-                </a:solidFill>
-              </a:rPr>
-              <a:t/>
-            </a:r>
             <a:br>
-              <a:rPr lang="en-US" sz="1050">
+              <a:rPr lang="en-US" sz="1050" dirty="0">
                 <a:solidFill>
                   <a:srgbClr val="7030A0"/>
                 </a:solidFill>
               </a:rPr>
             </a:br>
             <a:r>
-              <a:rPr lang="en-US" sz="1050" dirty="0" err="1" smtClean="0">
+              <a:rPr lang="en-US" sz="1050" dirty="0">
                 <a:solidFill>
                   <a:srgbClr val="7030A0"/>
                 </a:solidFill>
@@ -5532,8 +5503,8 @@
         </p:nvCxnSpPr>
         <p:spPr>
           <a:xfrm rot="16200000" flipH="1">
-            <a:off x="1364475" y="3719944"/>
-            <a:ext cx="831471" cy="554381"/>
+            <a:off x="742129" y="4342291"/>
+            <a:ext cx="1829142" cy="307360"/>
           </a:xfrm>
           <a:prstGeom prst="bentConnector2">
             <a:avLst/>
@@ -5567,15 +5538,14 @@
         <p:nvCxnSpPr>
           <p:cNvPr id="50" name="Elbow Connector 49"/>
           <p:cNvCxnSpPr>
-            <a:stCxn id="62" idx="0"/>
-            <a:endCxn id="57" idx="3"/>
+            <a:cxnSpLocks/>
           </p:cNvCxnSpPr>
           <p:nvPr/>
         </p:nvCxnSpPr>
         <p:spPr>
           <a:xfrm rot="16200000" flipV="1">
-            <a:off x="5948976" y="2139271"/>
-            <a:ext cx="404117" cy="1033473"/>
+            <a:off x="5920867" y="2161471"/>
+            <a:ext cx="398866" cy="994324"/>
           </a:xfrm>
           <a:prstGeom prst="bentConnector2">
             <a:avLst/>
@@ -5628,7 +5598,7 @@
           <a:p>
             <a:pPr algn="ctr"/>
             <a:r>
-              <a:rPr lang="en-US" sz="1100" dirty="0" smtClean="0">
+              <a:rPr lang="en-US" sz="1100" dirty="0">
                 <a:solidFill>
                   <a:srgbClr val="7030A0"/>
                 </a:solidFill>
@@ -5667,7 +5637,7 @@
           <a:p>
             <a:pPr algn="ctr"/>
             <a:r>
-              <a:rPr lang="en-US" sz="1100" dirty="0" smtClean="0">
+              <a:rPr lang="en-US" sz="1100" dirty="0">
                 <a:solidFill>
                   <a:srgbClr val="7030A0"/>
                 </a:solidFill>
@@ -5706,7 +5676,7 @@
           <a:p>
             <a:pPr algn="ctr"/>
             <a:r>
-              <a:rPr lang="en-US" sz="1100" dirty="0" smtClean="0">
+              <a:rPr lang="en-US" sz="1100" dirty="0">
                 <a:solidFill>
                   <a:srgbClr val="7030A0"/>
                 </a:solidFill>
@@ -5745,7 +5715,7 @@
           <a:p>
             <a:pPr algn="ctr"/>
             <a:r>
-              <a:rPr lang="en-US" sz="1100" dirty="0" smtClean="0">
+              <a:rPr lang="en-US" sz="1100" dirty="0">
                 <a:solidFill>
                   <a:srgbClr val="7030A0"/>
                 </a:solidFill>
@@ -5784,7 +5754,7 @@
           <a:p>
             <a:pPr algn="ctr"/>
             <a:r>
-              <a:rPr lang="en-US" sz="1100" dirty="0" smtClean="0">
+              <a:rPr lang="en-US" sz="1100" dirty="0">
                 <a:solidFill>
                   <a:srgbClr val="7030A0"/>
                 </a:solidFill>
@@ -5823,7 +5793,7 @@
           <a:p>
             <a:pPr algn="ctr"/>
             <a:r>
-              <a:rPr lang="en-US" sz="1100" dirty="0" smtClean="0">
+              <a:rPr lang="en-US" sz="1100" dirty="0">
                 <a:solidFill>
                   <a:srgbClr val="7030A0"/>
                 </a:solidFill>
@@ -5862,7 +5832,7 @@
           <a:p>
             <a:pPr algn="ctr"/>
             <a:r>
-              <a:rPr lang="en-US" sz="1100" dirty="0" smtClean="0">
+              <a:rPr lang="en-US" sz="1100" dirty="0">
                 <a:solidFill>
                   <a:srgbClr val="7030A0"/>
                 </a:solidFill>
@@ -5885,7 +5855,7 @@
         </p:nvSpPr>
         <p:spPr>
           <a:xfrm>
-            <a:off x="6667770" y="3210194"/>
+            <a:off x="6592424" y="3216286"/>
             <a:ext cx="189257" cy="178683"/>
           </a:xfrm>
           <a:prstGeom prst="rect">
@@ -5901,12 +5871,1065 @@
           <a:p>
             <a:pPr algn="ctr"/>
             <a:r>
-              <a:rPr lang="en-US" sz="1100" dirty="0" smtClean="0">
+              <a:rPr lang="en-US" sz="1100" dirty="0">
                 <a:solidFill>
                   <a:srgbClr val="7030A0"/>
                 </a:solidFill>
               </a:rPr>
               <a:t>1</a:t>
+            </a:r>
+            <a:endParaRPr lang="en-SG" sz="1100" dirty="0">
+              <a:solidFill>
+                <a:srgbClr val="7030A0"/>
+              </a:solidFill>
+            </a:endParaRPr>
+          </a:p>
+        </p:txBody>
+      </p:sp>
+      <p:cxnSp>
+        <p:nvCxnSpPr>
+          <p:cNvPr id="87" name="Elbow Connector 49">
+            <a:extLst>
+              <a:ext uri="{FF2B5EF4-FFF2-40B4-BE49-F238E27FC236}">
+                <a16:creationId xmlns:a16="http://schemas.microsoft.com/office/drawing/2014/main" id="{0E5F1C30-EDC1-4F2D-B95E-029EF293F90B}"/>
+              </a:ext>
+            </a:extLst>
+          </p:cNvPr>
+          <p:cNvCxnSpPr>
+            <a:cxnSpLocks/>
+            <a:endCxn id="98" idx="1"/>
+          </p:cNvCxnSpPr>
+          <p:nvPr/>
+        </p:nvCxnSpPr>
+        <p:spPr>
+          <a:xfrm rot="16200000" flipH="1">
+            <a:off x="3905463" y="3479024"/>
+            <a:ext cx="1055954" cy="160800"/>
+          </a:xfrm>
+          <a:prstGeom prst="bentConnector2">
+            <a:avLst/>
+          </a:prstGeom>
+          <a:ln w="19050">
+            <a:solidFill>
+              <a:srgbClr val="7030A0"/>
+            </a:solidFill>
+            <a:headEnd type="none" w="med" len="med"/>
+            <a:tailEnd type="arrow" w="med" len="med"/>
+          </a:ln>
+          <a:effectLst/>
+        </p:spPr>
+        <p:style>
+          <a:lnRef idx="1">
+            <a:schemeClr val="accent2"/>
+          </a:lnRef>
+          <a:fillRef idx="2">
+            <a:schemeClr val="accent2"/>
+          </a:fillRef>
+          <a:effectRef idx="1">
+            <a:schemeClr val="accent2"/>
+          </a:effectRef>
+          <a:fontRef idx="minor">
+            <a:schemeClr val="dk1"/>
+          </a:fontRef>
+        </p:style>
+      </p:cxnSp>
+      <p:sp>
+        <p:nvSpPr>
+          <p:cNvPr id="98" name="Rectangle 8">
+            <a:extLst>
+              <a:ext uri="{FF2B5EF4-FFF2-40B4-BE49-F238E27FC236}">
+                <a16:creationId xmlns:a16="http://schemas.microsoft.com/office/drawing/2014/main" id="{9C2BFFA9-555B-42A4-A252-9FB82C59574E}"/>
+              </a:ext>
+            </a:extLst>
+          </p:cNvPr>
+          <p:cNvSpPr/>
+          <p:nvPr/>
+        </p:nvSpPr>
+        <p:spPr>
+          <a:xfrm>
+            <a:off x="4513840" y="3914021"/>
+            <a:ext cx="1156969" cy="346760"/>
+          </a:xfrm>
+          <a:prstGeom prst="rect">
+            <a:avLst/>
+          </a:prstGeom>
+          <a:ln w="19050">
+            <a:solidFill>
+              <a:srgbClr val="7030A0"/>
+            </a:solidFill>
+          </a:ln>
+          <a:effectLst/>
+        </p:spPr>
+        <p:style>
+          <a:lnRef idx="1">
+            <a:schemeClr val="accent4"/>
+          </a:lnRef>
+          <a:fillRef idx="2">
+            <a:schemeClr val="accent4"/>
+          </a:fillRef>
+          <a:effectRef idx="1">
+            <a:schemeClr val="accent4"/>
+          </a:effectRef>
+          <a:fontRef idx="minor">
+            <a:schemeClr val="dk1"/>
+          </a:fontRef>
+        </p:style>
+        <p:txBody>
+          <a:bodyPr rtlCol="0" anchor="ctr"/>
+          <a:lstStyle/>
+          <a:p>
+            <a:pPr algn="ctr"/>
+            <a:r>
+              <a:rPr lang="en-US" sz="1050" dirty="0">
+                <a:solidFill>
+                  <a:srgbClr val="7030A0"/>
+                </a:solidFill>
+              </a:rPr>
+              <a:t>UniqueEventList</a:t>
+            </a:r>
+            <a:endParaRPr lang="en-SG" sz="1050" dirty="0">
+              <a:solidFill>
+                <a:srgbClr val="7030A0"/>
+              </a:solidFill>
+            </a:endParaRPr>
+          </a:p>
+        </p:txBody>
+      </p:sp>
+      <p:sp>
+        <p:nvSpPr>
+          <p:cNvPr id="104" name="TextBox 103">
+            <a:extLst>
+              <a:ext uri="{FF2B5EF4-FFF2-40B4-BE49-F238E27FC236}">
+                <a16:creationId xmlns:a16="http://schemas.microsoft.com/office/drawing/2014/main" id="{12D5743C-F37B-4336-BA91-35FE55C2DC83}"/>
+              </a:ext>
+            </a:extLst>
+          </p:cNvPr>
+          <p:cNvSpPr txBox="1"/>
+          <p:nvPr/>
+        </p:nvSpPr>
+        <p:spPr>
+          <a:xfrm>
+            <a:off x="4338811" y="3857108"/>
+            <a:ext cx="189257" cy="178683"/>
+          </a:xfrm>
+          <a:prstGeom prst="rect">
+            <a:avLst/>
+          </a:prstGeom>
+          <a:noFill/>
+        </p:spPr>
+        <p:txBody>
+          <a:bodyPr wrap="square" lIns="0" tIns="0" rIns="0" bIns="0" rtlCol="0">
+            <a:noAutofit/>
+          </a:bodyPr>
+          <a:lstStyle/>
+          <a:p>
+            <a:pPr algn="ctr"/>
+            <a:r>
+              <a:rPr lang="en-US" sz="1100" dirty="0">
+                <a:solidFill>
+                  <a:srgbClr val="7030A0"/>
+                </a:solidFill>
+              </a:rPr>
+              <a:t>1</a:t>
+            </a:r>
+            <a:endParaRPr lang="en-SG" sz="1100" dirty="0">
+              <a:solidFill>
+                <a:srgbClr val="7030A0"/>
+              </a:solidFill>
+            </a:endParaRPr>
+          </a:p>
+        </p:txBody>
+      </p:sp>
+      <p:sp>
+        <p:nvSpPr>
+          <p:cNvPr id="106" name="Flowchart: Decision 96">
+            <a:extLst>
+              <a:ext uri="{FF2B5EF4-FFF2-40B4-BE49-F238E27FC236}">
+                <a16:creationId xmlns:a16="http://schemas.microsoft.com/office/drawing/2014/main" id="{EC3DEF6E-35D6-4DC0-AEC6-F86E803BFE50}"/>
+              </a:ext>
+            </a:extLst>
+          </p:cNvPr>
+          <p:cNvSpPr/>
+          <p:nvPr/>
+        </p:nvSpPr>
+        <p:spPr>
+          <a:xfrm>
+            <a:off x="5666365" y="3997134"/>
+            <a:ext cx="236048" cy="173380"/>
+          </a:xfrm>
+          <a:prstGeom prst="flowChartDecision">
+            <a:avLst/>
+          </a:prstGeom>
+          <a:noFill/>
+          <a:ln w="19050">
+            <a:solidFill>
+              <a:srgbClr val="7030A0"/>
+            </a:solidFill>
+          </a:ln>
+          <a:effectLst/>
+        </p:spPr>
+        <p:style>
+          <a:lnRef idx="1">
+            <a:schemeClr val="accent6"/>
+          </a:lnRef>
+          <a:fillRef idx="2">
+            <a:schemeClr val="accent6"/>
+          </a:fillRef>
+          <a:effectRef idx="1">
+            <a:schemeClr val="accent6"/>
+          </a:effectRef>
+          <a:fontRef idx="minor">
+            <a:schemeClr val="dk1"/>
+          </a:fontRef>
+        </p:style>
+        <p:txBody>
+          <a:bodyPr rtlCol="0" anchor="ctr"/>
+          <a:lstStyle/>
+          <a:p>
+            <a:pPr algn="ctr"/>
+            <a:endParaRPr lang="en-US" sz="1050"/>
+          </a:p>
+        </p:txBody>
+      </p:sp>
+      <p:cxnSp>
+        <p:nvCxnSpPr>
+          <p:cNvPr id="108" name="Elbow Connector 63">
+            <a:extLst>
+              <a:ext uri="{FF2B5EF4-FFF2-40B4-BE49-F238E27FC236}">
+                <a16:creationId xmlns:a16="http://schemas.microsoft.com/office/drawing/2014/main" id="{2FA19544-FF8C-4C96-961B-9E4B0671E9B7}"/>
+              </a:ext>
+            </a:extLst>
+          </p:cNvPr>
+          <p:cNvCxnSpPr>
+            <a:cxnSpLocks/>
+          </p:cNvCxnSpPr>
+          <p:nvPr/>
+        </p:nvCxnSpPr>
+        <p:spPr>
+          <a:xfrm>
+            <a:off x="5902413" y="4083047"/>
+            <a:ext cx="360216" cy="777"/>
+          </a:xfrm>
+          <a:prstGeom prst="bentConnector3">
+            <a:avLst/>
+          </a:prstGeom>
+          <a:ln w="19050">
+            <a:solidFill>
+              <a:srgbClr val="7030A0"/>
+            </a:solidFill>
+            <a:headEnd type="none" w="med" len="med"/>
+            <a:tailEnd type="arrow" w="med" len="med"/>
+          </a:ln>
+          <a:effectLst/>
+        </p:spPr>
+        <p:style>
+          <a:lnRef idx="1">
+            <a:schemeClr val="accent2"/>
+          </a:lnRef>
+          <a:fillRef idx="2">
+            <a:schemeClr val="accent2"/>
+          </a:fillRef>
+          <a:effectRef idx="1">
+            <a:schemeClr val="accent2"/>
+          </a:effectRef>
+          <a:fontRef idx="minor">
+            <a:schemeClr val="dk1"/>
+          </a:fontRef>
+        </p:style>
+      </p:cxnSp>
+      <p:sp>
+        <p:nvSpPr>
+          <p:cNvPr id="109" name="Rectangle 8">
+            <a:extLst>
+              <a:ext uri="{FF2B5EF4-FFF2-40B4-BE49-F238E27FC236}">
+                <a16:creationId xmlns:a16="http://schemas.microsoft.com/office/drawing/2014/main" id="{C0FE4B13-24A9-4A13-9923-8A30F0E11AA3}"/>
+              </a:ext>
+            </a:extLst>
+          </p:cNvPr>
+          <p:cNvSpPr/>
+          <p:nvPr/>
+        </p:nvSpPr>
+        <p:spPr>
+          <a:xfrm>
+            <a:off x="6268939" y="3913753"/>
+            <a:ext cx="708186" cy="346760"/>
+          </a:xfrm>
+          <a:prstGeom prst="rect">
+            <a:avLst/>
+          </a:prstGeom>
+          <a:ln w="19050">
+            <a:solidFill>
+              <a:srgbClr val="7030A0"/>
+            </a:solidFill>
+          </a:ln>
+          <a:effectLst/>
+        </p:spPr>
+        <p:style>
+          <a:lnRef idx="1">
+            <a:schemeClr val="accent4"/>
+          </a:lnRef>
+          <a:fillRef idx="2">
+            <a:schemeClr val="accent4"/>
+          </a:fillRef>
+          <a:effectRef idx="1">
+            <a:schemeClr val="accent4"/>
+          </a:effectRef>
+          <a:fontRef idx="minor">
+            <a:schemeClr val="dk1"/>
+          </a:fontRef>
+        </p:style>
+        <p:txBody>
+          <a:bodyPr rtlCol="0" anchor="ctr"/>
+          <a:lstStyle/>
+          <a:p>
+            <a:pPr algn="ctr"/>
+            <a:r>
+              <a:rPr lang="en-US" sz="1050" dirty="0">
+                <a:solidFill>
+                  <a:srgbClr val="7030A0"/>
+                </a:solidFill>
+              </a:rPr>
+              <a:t>Event</a:t>
+            </a:r>
+            <a:endParaRPr lang="en-SG" sz="1050" dirty="0">
+              <a:solidFill>
+                <a:srgbClr val="7030A0"/>
+              </a:solidFill>
+            </a:endParaRPr>
+          </a:p>
+        </p:txBody>
+      </p:sp>
+      <p:sp>
+        <p:nvSpPr>
+          <p:cNvPr id="110" name="Flowchart: Decision 96">
+            <a:extLst>
+              <a:ext uri="{FF2B5EF4-FFF2-40B4-BE49-F238E27FC236}">
+                <a16:creationId xmlns:a16="http://schemas.microsoft.com/office/drawing/2014/main" id="{75474EE1-2C83-4468-9790-82FE07480195}"/>
+              </a:ext>
+            </a:extLst>
+          </p:cNvPr>
+          <p:cNvSpPr/>
+          <p:nvPr/>
+        </p:nvSpPr>
+        <p:spPr>
+          <a:xfrm>
+            <a:off x="6998197" y="3996357"/>
+            <a:ext cx="236048" cy="173380"/>
+          </a:xfrm>
+          <a:prstGeom prst="flowChartDecision">
+            <a:avLst/>
+          </a:prstGeom>
+          <a:solidFill>
+            <a:srgbClr val="7030A0"/>
+          </a:solidFill>
+          <a:ln w="19050">
+            <a:solidFill>
+              <a:srgbClr val="7030A0"/>
+            </a:solidFill>
+          </a:ln>
+          <a:effectLst/>
+        </p:spPr>
+        <p:style>
+          <a:lnRef idx="1">
+            <a:schemeClr val="accent6"/>
+          </a:lnRef>
+          <a:fillRef idx="2">
+            <a:schemeClr val="accent6"/>
+          </a:fillRef>
+          <a:effectRef idx="1">
+            <a:schemeClr val="accent6"/>
+          </a:effectRef>
+          <a:fontRef idx="minor">
+            <a:schemeClr val="dk1"/>
+          </a:fontRef>
+        </p:style>
+        <p:txBody>
+          <a:bodyPr rtlCol="0" anchor="ctr"/>
+          <a:lstStyle/>
+          <a:p>
+            <a:pPr algn="ctr"/>
+            <a:endParaRPr lang="en-US" sz="1050"/>
+          </a:p>
+        </p:txBody>
+      </p:sp>
+      <p:cxnSp>
+        <p:nvCxnSpPr>
+          <p:cNvPr id="111" name="Elbow Connector 80">
+            <a:extLst>
+              <a:ext uri="{FF2B5EF4-FFF2-40B4-BE49-F238E27FC236}">
+                <a16:creationId xmlns:a16="http://schemas.microsoft.com/office/drawing/2014/main" id="{CB240CAD-5E07-4F89-B3CD-E2A31F5259F6}"/>
+              </a:ext>
+            </a:extLst>
+          </p:cNvPr>
+          <p:cNvCxnSpPr>
+            <a:cxnSpLocks/>
+          </p:cNvCxnSpPr>
+          <p:nvPr/>
+        </p:nvCxnSpPr>
+        <p:spPr>
+          <a:xfrm flipV="1">
+            <a:off x="7212148" y="4075636"/>
+            <a:ext cx="399064" cy="1"/>
+          </a:xfrm>
+          <a:prstGeom prst="bentConnector3">
+            <a:avLst/>
+          </a:prstGeom>
+          <a:ln w="19050">
+            <a:solidFill>
+              <a:srgbClr val="7030A0"/>
+            </a:solidFill>
+            <a:headEnd type="none" w="med" len="med"/>
+            <a:tailEnd type="arrow" w="med" len="med"/>
+          </a:ln>
+          <a:effectLst/>
+        </p:spPr>
+        <p:style>
+          <a:lnRef idx="1">
+            <a:schemeClr val="accent2"/>
+          </a:lnRef>
+          <a:fillRef idx="2">
+            <a:schemeClr val="accent2"/>
+          </a:fillRef>
+          <a:effectRef idx="1">
+            <a:schemeClr val="accent2"/>
+          </a:effectRef>
+          <a:fontRef idx="minor">
+            <a:schemeClr val="dk1"/>
+          </a:fontRef>
+        </p:style>
+      </p:cxnSp>
+      <p:sp>
+        <p:nvSpPr>
+          <p:cNvPr id="115" name="Rectangle 8">
+            <a:extLst>
+              <a:ext uri="{FF2B5EF4-FFF2-40B4-BE49-F238E27FC236}">
+                <a16:creationId xmlns:a16="http://schemas.microsoft.com/office/drawing/2014/main" id="{805BF42E-8C3B-475B-AECF-89439F296996}"/>
+              </a:ext>
+            </a:extLst>
+          </p:cNvPr>
+          <p:cNvSpPr/>
+          <p:nvPr/>
+        </p:nvSpPr>
+        <p:spPr>
+          <a:xfrm>
+            <a:off x="7611212" y="3943570"/>
+            <a:ext cx="708186" cy="285783"/>
+          </a:xfrm>
+          <a:prstGeom prst="rect">
+            <a:avLst/>
+          </a:prstGeom>
+          <a:ln w="19050">
+            <a:solidFill>
+              <a:srgbClr val="7030A0"/>
+            </a:solidFill>
+          </a:ln>
+          <a:effectLst/>
+        </p:spPr>
+        <p:style>
+          <a:lnRef idx="1">
+            <a:schemeClr val="accent4"/>
+          </a:lnRef>
+          <a:fillRef idx="2">
+            <a:schemeClr val="accent4"/>
+          </a:fillRef>
+          <a:effectRef idx="1">
+            <a:schemeClr val="accent4"/>
+          </a:effectRef>
+          <a:fontRef idx="minor">
+            <a:schemeClr val="dk1"/>
+          </a:fontRef>
+        </p:style>
+        <p:txBody>
+          <a:bodyPr rtlCol="0" anchor="ctr"/>
+          <a:lstStyle/>
+          <a:p>
+            <a:pPr algn="ctr"/>
+            <a:r>
+              <a:rPr lang="en-US" sz="1050" dirty="0">
+                <a:solidFill>
+                  <a:srgbClr val="7030A0"/>
+                </a:solidFill>
+              </a:rPr>
+              <a:t>Header</a:t>
+            </a:r>
+            <a:endParaRPr lang="en-SG" sz="1050" dirty="0">
+              <a:solidFill>
+                <a:srgbClr val="7030A0"/>
+              </a:solidFill>
+            </a:endParaRPr>
+          </a:p>
+        </p:txBody>
+      </p:sp>
+      <p:cxnSp>
+        <p:nvCxnSpPr>
+          <p:cNvPr id="116" name="Elbow Connector 83">
+            <a:extLst>
+              <a:ext uri="{FF2B5EF4-FFF2-40B4-BE49-F238E27FC236}">
+                <a16:creationId xmlns:a16="http://schemas.microsoft.com/office/drawing/2014/main" id="{ABFD5A75-D9E6-4E24-AC94-3F5AD1730F69}"/>
+              </a:ext>
+            </a:extLst>
+          </p:cNvPr>
+          <p:cNvCxnSpPr>
+            <a:cxnSpLocks/>
+            <a:endCxn id="117" idx="1"/>
+          </p:cNvCxnSpPr>
+          <p:nvPr/>
+        </p:nvCxnSpPr>
+        <p:spPr>
+          <a:xfrm>
+            <a:off x="7208882" y="4080393"/>
+            <a:ext cx="404735" cy="332477"/>
+          </a:xfrm>
+          <a:prstGeom prst="bentConnector3">
+            <a:avLst/>
+          </a:prstGeom>
+          <a:ln w="19050">
+            <a:solidFill>
+              <a:srgbClr val="7030A0"/>
+            </a:solidFill>
+            <a:headEnd type="none" w="med" len="med"/>
+            <a:tailEnd type="arrow" w="med" len="med"/>
+          </a:ln>
+          <a:effectLst/>
+        </p:spPr>
+        <p:style>
+          <a:lnRef idx="1">
+            <a:schemeClr val="accent2"/>
+          </a:lnRef>
+          <a:fillRef idx="2">
+            <a:schemeClr val="accent2"/>
+          </a:fillRef>
+          <a:effectRef idx="1">
+            <a:schemeClr val="accent2"/>
+          </a:effectRef>
+          <a:fontRef idx="minor">
+            <a:schemeClr val="dk1"/>
+          </a:fontRef>
+        </p:style>
+      </p:cxnSp>
+      <p:sp>
+        <p:nvSpPr>
+          <p:cNvPr id="117" name="Rectangle 8">
+            <a:extLst>
+              <a:ext uri="{FF2B5EF4-FFF2-40B4-BE49-F238E27FC236}">
+                <a16:creationId xmlns:a16="http://schemas.microsoft.com/office/drawing/2014/main" id="{F05151B3-6BC0-4C25-863C-23861F6F04BD}"/>
+              </a:ext>
+            </a:extLst>
+          </p:cNvPr>
+          <p:cNvSpPr/>
+          <p:nvPr/>
+        </p:nvSpPr>
+        <p:spPr>
+          <a:xfrm>
+            <a:off x="7613617" y="4269978"/>
+            <a:ext cx="708186" cy="285783"/>
+          </a:xfrm>
+          <a:prstGeom prst="rect">
+            <a:avLst/>
+          </a:prstGeom>
+          <a:ln w="19050">
+            <a:solidFill>
+              <a:srgbClr val="7030A0"/>
+            </a:solidFill>
+          </a:ln>
+          <a:effectLst/>
+        </p:spPr>
+        <p:style>
+          <a:lnRef idx="1">
+            <a:schemeClr val="accent4"/>
+          </a:lnRef>
+          <a:fillRef idx="2">
+            <a:schemeClr val="accent4"/>
+          </a:fillRef>
+          <a:effectRef idx="1">
+            <a:schemeClr val="accent4"/>
+          </a:effectRef>
+          <a:fontRef idx="minor">
+            <a:schemeClr val="dk1"/>
+          </a:fontRef>
+        </p:style>
+        <p:txBody>
+          <a:bodyPr rtlCol="0" anchor="ctr"/>
+          <a:lstStyle/>
+          <a:p>
+            <a:pPr algn="ctr"/>
+            <a:r>
+              <a:rPr lang="en-US" sz="1050" dirty="0">
+                <a:solidFill>
+                  <a:srgbClr val="7030A0"/>
+                </a:solidFill>
+              </a:rPr>
+              <a:t>Desc</a:t>
+            </a:r>
+            <a:endParaRPr lang="en-SG" sz="1050" dirty="0">
+              <a:solidFill>
+                <a:srgbClr val="7030A0"/>
+              </a:solidFill>
+            </a:endParaRPr>
+          </a:p>
+        </p:txBody>
+      </p:sp>
+      <p:cxnSp>
+        <p:nvCxnSpPr>
+          <p:cNvPr id="121" name="Elbow Connector 83">
+            <a:extLst>
+              <a:ext uri="{FF2B5EF4-FFF2-40B4-BE49-F238E27FC236}">
+                <a16:creationId xmlns:a16="http://schemas.microsoft.com/office/drawing/2014/main" id="{CE7E8C0B-E49F-4225-92B9-2C0D6041C314}"/>
+              </a:ext>
+            </a:extLst>
+          </p:cNvPr>
+          <p:cNvCxnSpPr>
+            <a:cxnSpLocks/>
+            <a:endCxn id="123" idx="1"/>
+          </p:cNvCxnSpPr>
+          <p:nvPr/>
+        </p:nvCxnSpPr>
+        <p:spPr>
+          <a:xfrm rot="16200000" flipH="1">
+            <a:off x="7185247" y="4312759"/>
+            <a:ext cx="651968" cy="199960"/>
+          </a:xfrm>
+          <a:prstGeom prst="bentConnector2">
+            <a:avLst/>
+          </a:prstGeom>
+          <a:ln w="19050">
+            <a:solidFill>
+              <a:srgbClr val="7030A0"/>
+            </a:solidFill>
+            <a:headEnd type="none" w="med" len="med"/>
+            <a:tailEnd type="arrow" w="med" len="med"/>
+          </a:ln>
+          <a:effectLst/>
+        </p:spPr>
+        <p:style>
+          <a:lnRef idx="1">
+            <a:schemeClr val="accent2"/>
+          </a:lnRef>
+          <a:fillRef idx="2">
+            <a:schemeClr val="accent2"/>
+          </a:fillRef>
+          <a:effectRef idx="1">
+            <a:schemeClr val="accent2"/>
+          </a:effectRef>
+          <a:fontRef idx="minor">
+            <a:schemeClr val="dk1"/>
+          </a:fontRef>
+        </p:style>
+      </p:cxnSp>
+      <p:sp>
+        <p:nvSpPr>
+          <p:cNvPr id="123" name="Rectangle 8">
+            <a:extLst>
+              <a:ext uri="{FF2B5EF4-FFF2-40B4-BE49-F238E27FC236}">
+                <a16:creationId xmlns:a16="http://schemas.microsoft.com/office/drawing/2014/main" id="{32758261-DE08-492F-A700-9BCF4F00845C}"/>
+              </a:ext>
+            </a:extLst>
+          </p:cNvPr>
+          <p:cNvSpPr/>
+          <p:nvPr/>
+        </p:nvSpPr>
+        <p:spPr>
+          <a:xfrm>
+            <a:off x="7611211" y="4595831"/>
+            <a:ext cx="809371" cy="285783"/>
+          </a:xfrm>
+          <a:prstGeom prst="rect">
+            <a:avLst/>
+          </a:prstGeom>
+          <a:ln w="19050">
+            <a:solidFill>
+              <a:srgbClr val="7030A0"/>
+            </a:solidFill>
+          </a:ln>
+          <a:effectLst/>
+        </p:spPr>
+        <p:style>
+          <a:lnRef idx="1">
+            <a:schemeClr val="accent4"/>
+          </a:lnRef>
+          <a:fillRef idx="2">
+            <a:schemeClr val="accent4"/>
+          </a:fillRef>
+          <a:effectRef idx="1">
+            <a:schemeClr val="accent4"/>
+          </a:effectRef>
+          <a:fontRef idx="minor">
+            <a:schemeClr val="dk1"/>
+          </a:fontRef>
+        </p:style>
+        <p:txBody>
+          <a:bodyPr rtlCol="0" anchor="ctr"/>
+          <a:lstStyle/>
+          <a:p>
+            <a:pPr algn="ctr"/>
+            <a:r>
+              <a:rPr lang="en-US" sz="1050" dirty="0">
+                <a:solidFill>
+                  <a:srgbClr val="7030A0"/>
+                </a:solidFill>
+              </a:rPr>
+              <a:t>EventDate</a:t>
+            </a:r>
+            <a:endParaRPr lang="en-SG" sz="1050" dirty="0">
+              <a:solidFill>
+                <a:srgbClr val="7030A0"/>
+              </a:solidFill>
+            </a:endParaRPr>
+          </a:p>
+        </p:txBody>
+      </p:sp>
+      <p:sp>
+        <p:nvSpPr>
+          <p:cNvPr id="126" name="TextBox 125">
+            <a:extLst>
+              <a:ext uri="{FF2B5EF4-FFF2-40B4-BE49-F238E27FC236}">
+                <a16:creationId xmlns:a16="http://schemas.microsoft.com/office/drawing/2014/main" id="{5EAF537E-8148-4844-9142-F84DCA920694}"/>
+              </a:ext>
+            </a:extLst>
+          </p:cNvPr>
+          <p:cNvSpPr txBox="1"/>
+          <p:nvPr/>
+        </p:nvSpPr>
+        <p:spPr>
+          <a:xfrm>
+            <a:off x="6073372" y="4157289"/>
+            <a:ext cx="189257" cy="178683"/>
+          </a:xfrm>
+          <a:prstGeom prst="rect">
+            <a:avLst/>
+          </a:prstGeom>
+          <a:noFill/>
+        </p:spPr>
+        <p:txBody>
+          <a:bodyPr wrap="square" lIns="0" tIns="0" rIns="0" bIns="0" rtlCol="0">
+            <a:noAutofit/>
+          </a:bodyPr>
+          <a:lstStyle/>
+          <a:p>
+            <a:pPr algn="ctr"/>
+            <a:r>
+              <a:rPr lang="en-US" sz="1100" dirty="0">
+                <a:solidFill>
+                  <a:srgbClr val="7030A0"/>
+                </a:solidFill>
+              </a:rPr>
+              <a:t>*</a:t>
+            </a:r>
+            <a:endParaRPr lang="en-SG" sz="1100" dirty="0">
+              <a:solidFill>
+                <a:srgbClr val="7030A0"/>
+              </a:solidFill>
+            </a:endParaRPr>
+          </a:p>
+        </p:txBody>
+      </p:sp>
+      <p:sp>
+        <p:nvSpPr>
+          <p:cNvPr id="127" name="TextBox 126">
+            <a:extLst>
+              <a:ext uri="{FF2B5EF4-FFF2-40B4-BE49-F238E27FC236}">
+                <a16:creationId xmlns:a16="http://schemas.microsoft.com/office/drawing/2014/main" id="{60D27776-E08B-4B48-BE2A-989603099657}"/>
+              </a:ext>
+            </a:extLst>
+          </p:cNvPr>
+          <p:cNvSpPr txBox="1"/>
+          <p:nvPr/>
+        </p:nvSpPr>
+        <p:spPr>
+          <a:xfrm>
+            <a:off x="6389238" y="4301898"/>
+            <a:ext cx="189257" cy="178683"/>
+          </a:xfrm>
+          <a:prstGeom prst="rect">
+            <a:avLst/>
+          </a:prstGeom>
+          <a:noFill/>
+        </p:spPr>
+        <p:txBody>
+          <a:bodyPr wrap="square" lIns="0" tIns="0" rIns="0" bIns="0" rtlCol="0">
+            <a:noAutofit/>
+          </a:bodyPr>
+          <a:lstStyle/>
+          <a:p>
+            <a:pPr algn="ctr"/>
+            <a:r>
+              <a:rPr lang="en-US" sz="1100" dirty="0">
+                <a:solidFill>
+                  <a:srgbClr val="7030A0"/>
+                </a:solidFill>
+              </a:rPr>
+              <a:t>1</a:t>
+            </a:r>
+            <a:endParaRPr lang="en-SG" sz="1100" dirty="0">
+              <a:solidFill>
+                <a:srgbClr val="7030A0"/>
+              </a:solidFill>
+            </a:endParaRPr>
+          </a:p>
+        </p:txBody>
+      </p:sp>
+      <p:cxnSp>
+        <p:nvCxnSpPr>
+          <p:cNvPr id="128" name="Elbow Connector 63">
+            <a:extLst>
+              <a:ext uri="{FF2B5EF4-FFF2-40B4-BE49-F238E27FC236}">
+                <a16:creationId xmlns:a16="http://schemas.microsoft.com/office/drawing/2014/main" id="{121E875F-E239-45A6-BE48-89B1C956D972}"/>
+              </a:ext>
+            </a:extLst>
+          </p:cNvPr>
+          <p:cNvCxnSpPr/>
+          <p:nvPr/>
+        </p:nvCxnSpPr>
+        <p:spPr>
+          <a:xfrm flipV="1">
+            <a:off x="6461378" y="4245231"/>
+            <a:ext cx="95385" cy="416514"/>
+          </a:xfrm>
+          <a:prstGeom prst="bentConnector2">
+            <a:avLst/>
+          </a:prstGeom>
+          <a:ln w="19050">
+            <a:solidFill>
+              <a:srgbClr val="7030A0"/>
+            </a:solidFill>
+            <a:prstDash val="sysDot"/>
+            <a:headEnd type="none" w="med" len="med"/>
+            <a:tailEnd type="none" w="med" len="med"/>
+          </a:ln>
+          <a:effectLst/>
+        </p:spPr>
+        <p:style>
+          <a:lnRef idx="1">
+            <a:schemeClr val="accent2"/>
+          </a:lnRef>
+          <a:fillRef idx="2">
+            <a:schemeClr val="accent2"/>
+          </a:fillRef>
+          <a:effectRef idx="1">
+            <a:schemeClr val="accent2"/>
+          </a:effectRef>
+          <a:fontRef idx="minor">
+            <a:schemeClr val="dk1"/>
+          </a:fontRef>
+        </p:style>
+      </p:cxnSp>
+      <p:sp>
+        <p:nvSpPr>
+          <p:cNvPr id="129" name="Isosceles Triangle 102">
+            <a:extLst>
+              <a:ext uri="{FF2B5EF4-FFF2-40B4-BE49-F238E27FC236}">
+                <a16:creationId xmlns:a16="http://schemas.microsoft.com/office/drawing/2014/main" id="{03FA6DA2-90D8-4DE4-9CC1-CAC678DB5D03}"/>
+              </a:ext>
+            </a:extLst>
+          </p:cNvPr>
+          <p:cNvSpPr/>
+          <p:nvPr/>
+        </p:nvSpPr>
+        <p:spPr>
+          <a:xfrm rot="5400000" flipV="1">
+            <a:off x="6238364" y="4582412"/>
+            <a:ext cx="270504" cy="175523"/>
+          </a:xfrm>
+          <a:prstGeom prst="triangle">
+            <a:avLst/>
+          </a:prstGeom>
+          <a:solidFill>
+            <a:srgbClr val="7030A0"/>
+          </a:solidFill>
+          <a:ln w="19050">
+            <a:solidFill>
+              <a:srgbClr val="7030A0"/>
+            </a:solidFill>
+          </a:ln>
+          <a:effectLst/>
+        </p:spPr>
+        <p:style>
+          <a:lnRef idx="1">
+            <a:schemeClr val="accent4"/>
+          </a:lnRef>
+          <a:fillRef idx="2">
+            <a:schemeClr val="accent4"/>
+          </a:fillRef>
+          <a:effectRef idx="1">
+            <a:schemeClr val="accent4"/>
+          </a:effectRef>
+          <a:fontRef idx="minor">
+            <a:schemeClr val="dk1"/>
+          </a:fontRef>
+        </p:style>
+        <p:txBody>
+          <a:bodyPr rtlCol="0" anchor="ctr"/>
+          <a:lstStyle/>
+          <a:p>
+            <a:pPr algn="ctr"/>
+            <a:endParaRPr lang="en-SG" sz="1050" b="1">
+              <a:solidFill>
+                <a:srgbClr val="92D050"/>
+              </a:solidFill>
+            </a:endParaRPr>
+          </a:p>
+        </p:txBody>
+      </p:sp>
+      <p:sp>
+        <p:nvSpPr>
+          <p:cNvPr id="130" name="Rectangle 8">
+            <a:extLst>
+              <a:ext uri="{FF2B5EF4-FFF2-40B4-BE49-F238E27FC236}">
+                <a16:creationId xmlns:a16="http://schemas.microsoft.com/office/drawing/2014/main" id="{7962C377-525B-4F4C-88D9-CBDFA92286CD}"/>
+              </a:ext>
+            </a:extLst>
+          </p:cNvPr>
+          <p:cNvSpPr/>
+          <p:nvPr/>
+        </p:nvSpPr>
+        <p:spPr>
+          <a:xfrm>
+            <a:off x="5105660" y="4495650"/>
+            <a:ext cx="1156969" cy="346760"/>
+          </a:xfrm>
+          <a:prstGeom prst="rect">
+            <a:avLst/>
+          </a:prstGeom>
+          <a:ln w="19050">
+            <a:solidFill>
+              <a:srgbClr val="7030A0"/>
+            </a:solidFill>
+          </a:ln>
+          <a:effectLst/>
+        </p:spPr>
+        <p:style>
+          <a:lnRef idx="1">
+            <a:schemeClr val="accent4"/>
+          </a:lnRef>
+          <a:fillRef idx="2">
+            <a:schemeClr val="accent4"/>
+          </a:fillRef>
+          <a:effectRef idx="1">
+            <a:schemeClr val="accent4"/>
+          </a:effectRef>
+          <a:fontRef idx="minor">
+            <a:schemeClr val="dk1"/>
+          </a:fontRef>
+        </p:style>
+        <p:txBody>
+          <a:bodyPr rtlCol="0" anchor="ctr"/>
+          <a:lstStyle/>
+          <a:p>
+            <a:pPr algn="ctr"/>
+            <a:r>
+              <a:rPr lang="en-US" sz="1050" dirty="0">
+                <a:solidFill>
+                  <a:srgbClr val="7030A0"/>
+                </a:solidFill>
+              </a:rPr>
+              <a:t>&lt;&lt;interface&gt;&gt;</a:t>
+            </a:r>
+            <a:br>
+              <a:rPr lang="en-US" sz="1050" dirty="0">
+                <a:solidFill>
+                  <a:srgbClr val="7030A0"/>
+                </a:solidFill>
+              </a:rPr>
+            </a:br>
+            <a:r>
+              <a:rPr lang="en-US" sz="1050" dirty="0">
+                <a:solidFill>
+                  <a:srgbClr val="7030A0"/>
+                </a:solidFill>
+              </a:rPr>
+              <a:t>ReadOnlyEvent</a:t>
+            </a:r>
+            <a:endParaRPr lang="en-SG" sz="1050" dirty="0">
+              <a:solidFill>
+                <a:srgbClr val="7030A0"/>
+              </a:solidFill>
+            </a:endParaRPr>
+          </a:p>
+        </p:txBody>
+      </p:sp>
+      <p:cxnSp>
+        <p:nvCxnSpPr>
+          <p:cNvPr id="131" name="Elbow Connector 106">
+            <a:extLst>
+              <a:ext uri="{FF2B5EF4-FFF2-40B4-BE49-F238E27FC236}">
+                <a16:creationId xmlns:a16="http://schemas.microsoft.com/office/drawing/2014/main" id="{E8FA94F7-D2D5-4725-8A2E-918963D7AF1A}"/>
+              </a:ext>
+            </a:extLst>
+          </p:cNvPr>
+          <p:cNvCxnSpPr>
+            <a:cxnSpLocks/>
+          </p:cNvCxnSpPr>
+          <p:nvPr/>
+        </p:nvCxnSpPr>
+        <p:spPr>
+          <a:xfrm rot="16200000" flipH="1">
+            <a:off x="4140876" y="1720900"/>
+            <a:ext cx="671628" cy="4392251"/>
+          </a:xfrm>
+          <a:prstGeom prst="bentConnector3">
+            <a:avLst>
+              <a:gd name="adj1" fmla="val 213456"/>
+            </a:avLst>
+          </a:prstGeom>
+          <a:ln w="19050">
+            <a:solidFill>
+              <a:srgbClr val="7030A0"/>
+            </a:solidFill>
+            <a:headEnd type="none" w="med" len="med"/>
+            <a:tailEnd type="arrow" w="med" len="med"/>
+          </a:ln>
+        </p:spPr>
+        <p:style>
+          <a:lnRef idx="1">
+            <a:schemeClr val="accent4"/>
+          </a:lnRef>
+          <a:fillRef idx="0">
+            <a:schemeClr val="accent4"/>
+          </a:fillRef>
+          <a:effectRef idx="0">
+            <a:schemeClr val="accent4"/>
+          </a:effectRef>
+          <a:fontRef idx="minor">
+            <a:schemeClr val="tx1"/>
+          </a:fontRef>
+        </p:style>
+      </p:cxnSp>
+      <p:sp>
+        <p:nvSpPr>
+          <p:cNvPr id="137" name="TextBox 136">
+            <a:extLst>
+              <a:ext uri="{FF2B5EF4-FFF2-40B4-BE49-F238E27FC236}">
+                <a16:creationId xmlns:a16="http://schemas.microsoft.com/office/drawing/2014/main" id="{0C8197C9-37FA-4D5E-8556-45DF1EC61C9F}"/>
+              </a:ext>
+            </a:extLst>
+          </p:cNvPr>
+          <p:cNvSpPr txBox="1"/>
+          <p:nvPr/>
+        </p:nvSpPr>
+        <p:spPr>
+          <a:xfrm rot="16200000">
+            <a:off x="6402529" y="4607917"/>
+            <a:ext cx="881018" cy="261610"/>
+          </a:xfrm>
+          <a:prstGeom prst="rect">
+            <a:avLst/>
+          </a:prstGeom>
+          <a:noFill/>
+        </p:spPr>
+        <p:txBody>
+          <a:bodyPr wrap="square" rtlCol="0">
+            <a:spAutoFit/>
+          </a:bodyPr>
+          <a:lstStyle/>
+          <a:p>
+            <a:pPr algn="r"/>
+            <a:r>
+              <a:rPr lang="en-US" sz="1100" dirty="0">
+                <a:solidFill>
+                  <a:srgbClr val="7030A0"/>
+                </a:solidFill>
+              </a:rPr>
+              <a:t>filtered list</a:t>
             </a:r>
             <a:endParaRPr lang="en-SG" sz="1100" dirty="0">
               <a:solidFill>
@@ -5926,13 +6949,6 @@
   <p:clrMapOvr>
     <a:masterClrMapping/>
   </p:clrMapOvr>
-  <p:timing>
-    <p:tnLst>
-      <p:par>
-        <p:cTn id="1" dur="indefinite" restart="never" nodeType="tmRoot"/>
-      </p:par>
-    </p:tnLst>
-  </p:timing>
 </p:sld>
 </file>
 

</xml_diff>